<commit_message>
Added more nowcasting documentation and tables (v0.10)
</commit_message>
<xml_diff>
--- a/documentation/images.pptx
+++ b/documentation/images.pptx
@@ -260,7 +260,7 @@
           <a:p>
             <a:fld id="{2A6F2152-3355-44FC-9B51-68879DB03112}" type="datetimeFigureOut">
               <a:rPr lang="en-US" smtClean="0"/>
-              <a:t>2/23/2021</a:t>
+              <a:t>3/3/2021</a:t>
             </a:fld>
             <a:endParaRPr lang="en-US"/>
           </a:p>
@@ -458,7 +458,7 @@
           <a:p>
             <a:fld id="{2A6F2152-3355-44FC-9B51-68879DB03112}" type="datetimeFigureOut">
               <a:rPr lang="en-US" smtClean="0"/>
-              <a:t>2/23/2021</a:t>
+              <a:t>3/3/2021</a:t>
             </a:fld>
             <a:endParaRPr lang="en-US"/>
           </a:p>
@@ -666,7 +666,7 @@
           <a:p>
             <a:fld id="{2A6F2152-3355-44FC-9B51-68879DB03112}" type="datetimeFigureOut">
               <a:rPr lang="en-US" smtClean="0"/>
-              <a:t>2/23/2021</a:t>
+              <a:t>3/3/2021</a:t>
             </a:fld>
             <a:endParaRPr lang="en-US"/>
           </a:p>
@@ -864,7 +864,7 @@
           <a:p>
             <a:fld id="{2A6F2152-3355-44FC-9B51-68879DB03112}" type="datetimeFigureOut">
               <a:rPr lang="en-US" smtClean="0"/>
-              <a:t>2/23/2021</a:t>
+              <a:t>3/3/2021</a:t>
             </a:fld>
             <a:endParaRPr lang="en-US"/>
           </a:p>
@@ -1139,7 +1139,7 @@
           <a:p>
             <a:fld id="{2A6F2152-3355-44FC-9B51-68879DB03112}" type="datetimeFigureOut">
               <a:rPr lang="en-US" smtClean="0"/>
-              <a:t>2/23/2021</a:t>
+              <a:t>3/3/2021</a:t>
             </a:fld>
             <a:endParaRPr lang="en-US"/>
           </a:p>
@@ -1404,7 +1404,7 @@
           <a:p>
             <a:fld id="{2A6F2152-3355-44FC-9B51-68879DB03112}" type="datetimeFigureOut">
               <a:rPr lang="en-US" smtClean="0"/>
-              <a:t>2/23/2021</a:t>
+              <a:t>3/3/2021</a:t>
             </a:fld>
             <a:endParaRPr lang="en-US"/>
           </a:p>
@@ -1816,7 +1816,7 @@
           <a:p>
             <a:fld id="{2A6F2152-3355-44FC-9B51-68879DB03112}" type="datetimeFigureOut">
               <a:rPr lang="en-US" smtClean="0"/>
-              <a:t>2/23/2021</a:t>
+              <a:t>3/3/2021</a:t>
             </a:fld>
             <a:endParaRPr lang="en-US"/>
           </a:p>
@@ -1957,7 +1957,7 @@
           <a:p>
             <a:fld id="{2A6F2152-3355-44FC-9B51-68879DB03112}" type="datetimeFigureOut">
               <a:rPr lang="en-US" smtClean="0"/>
-              <a:t>2/23/2021</a:t>
+              <a:t>3/3/2021</a:t>
             </a:fld>
             <a:endParaRPr lang="en-US"/>
           </a:p>
@@ -2070,7 +2070,7 @@
           <a:p>
             <a:fld id="{2A6F2152-3355-44FC-9B51-68879DB03112}" type="datetimeFigureOut">
               <a:rPr lang="en-US" smtClean="0"/>
-              <a:t>2/23/2021</a:t>
+              <a:t>3/3/2021</a:t>
             </a:fld>
             <a:endParaRPr lang="en-US"/>
           </a:p>
@@ -2381,7 +2381,7 @@
           <a:p>
             <a:fld id="{2A6F2152-3355-44FC-9B51-68879DB03112}" type="datetimeFigureOut">
               <a:rPr lang="en-US" smtClean="0"/>
-              <a:t>2/23/2021</a:t>
+              <a:t>3/3/2021</a:t>
             </a:fld>
             <a:endParaRPr lang="en-US"/>
           </a:p>
@@ -2669,7 +2669,7 @@
           <a:p>
             <a:fld id="{2A6F2152-3355-44FC-9B51-68879DB03112}" type="datetimeFigureOut">
               <a:rPr lang="en-US" smtClean="0"/>
-              <a:t>2/23/2021</a:t>
+              <a:t>3/3/2021</a:t>
             </a:fld>
             <a:endParaRPr lang="en-US"/>
           </a:p>
@@ -2910,7 +2910,7 @@
           <a:p>
             <a:fld id="{2A6F2152-3355-44FC-9B51-68879DB03112}" type="datetimeFigureOut">
               <a:rPr lang="en-US" smtClean="0"/>
-              <a:t>2/23/2021</a:t>
+              <a:t>3/3/2021</a:t>
             </a:fld>
             <a:endParaRPr lang="en-US"/>
           </a:p>
@@ -3934,6 +3934,530 @@
           </a:fontRef>
         </p:style>
       </p:cxnSp>
+      <p:sp>
+        <p:nvSpPr>
+          <p:cNvPr id="2" name="Right Brace 1">
+            <a:extLst>
+              <a:ext uri="{FF2B5EF4-FFF2-40B4-BE49-F238E27FC236}">
+                <a16:creationId xmlns:a16="http://schemas.microsoft.com/office/drawing/2014/main" id="{9CC832AC-8892-4132-9D90-59B30E390D3E}"/>
+              </a:ext>
+            </a:extLst>
+          </p:cNvPr>
+          <p:cNvSpPr/>
+          <p:nvPr/>
+        </p:nvSpPr>
+        <p:spPr>
+          <a:xfrm rot="16200000" flipH="1">
+            <a:off x="2448620" y="1506802"/>
+            <a:ext cx="276998" cy="2623560"/>
+          </a:xfrm>
+          <a:prstGeom prst="rightBrace">
+            <a:avLst/>
+          </a:prstGeom>
+        </p:spPr>
+        <p:style>
+          <a:lnRef idx="3">
+            <a:schemeClr val="accent6"/>
+          </a:lnRef>
+          <a:fillRef idx="0">
+            <a:schemeClr val="accent6"/>
+          </a:fillRef>
+          <a:effectRef idx="2">
+            <a:schemeClr val="accent6"/>
+          </a:effectRef>
+          <a:fontRef idx="minor">
+            <a:schemeClr val="tx1"/>
+          </a:fontRef>
+        </p:style>
+        <p:txBody>
+          <a:bodyPr rtlCol="0" anchor="ctr"/>
+          <a:lstStyle/>
+          <a:p>
+            <a:pPr algn="ctr"/>
+            <a:endParaRPr lang="en-US">
+              <a:solidFill>
+                <a:schemeClr val="accent6">
+                  <a:lumMod val="50000"/>
+                </a:schemeClr>
+              </a:solidFill>
+            </a:endParaRPr>
+          </a:p>
+        </p:txBody>
+      </p:sp>
+      <p:sp>
+        <p:nvSpPr>
+          <p:cNvPr id="28" name="TextBox 27">
+            <a:extLst>
+              <a:ext uri="{FF2B5EF4-FFF2-40B4-BE49-F238E27FC236}">
+                <a16:creationId xmlns:a16="http://schemas.microsoft.com/office/drawing/2014/main" id="{8E7A90F5-2511-4215-92FB-C331ED33D59B}"/>
+              </a:ext>
+            </a:extLst>
+          </p:cNvPr>
+          <p:cNvSpPr txBox="1"/>
+          <p:nvPr/>
+        </p:nvSpPr>
+        <p:spPr>
+          <a:xfrm>
+            <a:off x="1072112" y="2986464"/>
+            <a:ext cx="3180911" cy="461665"/>
+          </a:xfrm>
+          <a:prstGeom prst="rect">
+            <a:avLst/>
+          </a:prstGeom>
+        </p:spPr>
+        <p:style>
+          <a:lnRef idx="2">
+            <a:schemeClr val="accent6"/>
+          </a:lnRef>
+          <a:fillRef idx="1">
+            <a:schemeClr val="lt1"/>
+          </a:fillRef>
+          <a:effectRef idx="0">
+            <a:schemeClr val="accent6"/>
+          </a:effectRef>
+          <a:fontRef idx="minor">
+            <a:schemeClr val="dk1"/>
+          </a:fontRef>
+        </p:style>
+        <p:txBody>
+          <a:bodyPr wrap="square">
+            <a:spAutoFit/>
+          </a:bodyPr>
+          <a:lstStyle/>
+          <a:p>
+            <a:pPr algn="ctr"/>
+            <a:r>
+              <a:rPr lang="en-US" sz="1200" b="1" dirty="0">
+                <a:solidFill>
+                  <a:schemeClr val="tx1"/>
+                </a:solidFill>
+                <a:latin typeface="Consolas" panose="020B0609020204030204" pitchFamily="49" charset="0"/>
+              </a:rPr>
+              <a:t>1. Extract</a:t>
+            </a:r>
+            <a:r>
+              <a:rPr lang="en-US" sz="1200" dirty="0">
+                <a:solidFill>
+                  <a:schemeClr val="tx1"/>
+                </a:solidFill>
+                <a:latin typeface="Consolas" panose="020B0609020204030204" pitchFamily="49" charset="0"/>
+              </a:rPr>
+              <a:t> principal components from monthly data</a:t>
+            </a:r>
+          </a:p>
+        </p:txBody>
+      </p:sp>
+      <p:sp>
+        <p:nvSpPr>
+          <p:cNvPr id="29" name="Right Brace 28">
+            <a:extLst>
+              <a:ext uri="{FF2B5EF4-FFF2-40B4-BE49-F238E27FC236}">
+                <a16:creationId xmlns:a16="http://schemas.microsoft.com/office/drawing/2014/main" id="{0FFC774B-A14E-4647-A912-74432444CCF6}"/>
+              </a:ext>
+            </a:extLst>
+          </p:cNvPr>
+          <p:cNvSpPr/>
+          <p:nvPr/>
+        </p:nvSpPr>
+        <p:spPr>
+          <a:xfrm rot="16200000" flipH="1">
+            <a:off x="2448620" y="2358481"/>
+            <a:ext cx="276998" cy="2746512"/>
+          </a:xfrm>
+          <a:prstGeom prst="rightBrace">
+            <a:avLst/>
+          </a:prstGeom>
+        </p:spPr>
+        <p:style>
+          <a:lnRef idx="3">
+            <a:schemeClr val="accent1"/>
+          </a:lnRef>
+          <a:fillRef idx="0">
+            <a:schemeClr val="accent1"/>
+          </a:fillRef>
+          <a:effectRef idx="2">
+            <a:schemeClr val="accent1"/>
+          </a:effectRef>
+          <a:fontRef idx="minor">
+            <a:schemeClr val="tx1"/>
+          </a:fontRef>
+        </p:style>
+        <p:txBody>
+          <a:bodyPr rtlCol="0" anchor="ctr"/>
+          <a:lstStyle/>
+          <a:p>
+            <a:pPr algn="ctr"/>
+            <a:endParaRPr lang="en-US"/>
+          </a:p>
+        </p:txBody>
+      </p:sp>
+      <p:sp>
+        <p:nvSpPr>
+          <p:cNvPr id="30" name="TextBox 29">
+            <a:extLst>
+              <a:ext uri="{FF2B5EF4-FFF2-40B4-BE49-F238E27FC236}">
+                <a16:creationId xmlns:a16="http://schemas.microsoft.com/office/drawing/2014/main" id="{CC83EC8E-B747-4F7F-8CF0-DE3C8BC2C86F}"/>
+              </a:ext>
+            </a:extLst>
+          </p:cNvPr>
+          <p:cNvSpPr txBox="1"/>
+          <p:nvPr/>
+        </p:nvSpPr>
+        <p:spPr>
+          <a:xfrm>
+            <a:off x="1758949" y="4798533"/>
+            <a:ext cx="4493071" cy="646331"/>
+          </a:xfrm>
+          <a:prstGeom prst="rect">
+            <a:avLst/>
+          </a:prstGeom>
+        </p:spPr>
+        <p:style>
+          <a:lnRef idx="2">
+            <a:schemeClr val="accent2"/>
+          </a:lnRef>
+          <a:fillRef idx="1">
+            <a:schemeClr val="lt1"/>
+          </a:fillRef>
+          <a:effectRef idx="0">
+            <a:schemeClr val="accent2"/>
+          </a:effectRef>
+          <a:fontRef idx="minor">
+            <a:schemeClr val="dk1"/>
+          </a:fontRef>
+        </p:style>
+        <p:txBody>
+          <a:bodyPr wrap="square">
+            <a:spAutoFit/>
+          </a:bodyPr>
+          <a:lstStyle/>
+          <a:p>
+            <a:pPr algn="ctr"/>
+            <a:r>
+              <a:rPr lang="en-US" sz="1200" b="1" dirty="0">
+                <a:latin typeface="Consolas" panose="020B0609020204030204" pitchFamily="49" charset="0"/>
+              </a:rPr>
+              <a:t>4. Adjust</a:t>
+            </a:r>
+            <a:r>
+              <a:rPr lang="en-US" sz="1200" dirty="0">
+                <a:latin typeface="Consolas" panose="020B0609020204030204" pitchFamily="49" charset="0"/>
+              </a:rPr>
+              <a:t> for ragged edges of indicator data principal components data with state-space model and Kalman smoother</a:t>
+            </a:r>
+            <a:endParaRPr lang="en-US" sz="1200" b="1" dirty="0">
+              <a:latin typeface="Consolas" panose="020B0609020204030204" pitchFamily="49" charset="0"/>
+            </a:endParaRPr>
+          </a:p>
+        </p:txBody>
+      </p:sp>
+      <p:cxnSp>
+        <p:nvCxnSpPr>
+          <p:cNvPr id="4" name="Straight Arrow Connector 3">
+            <a:extLst>
+              <a:ext uri="{FF2B5EF4-FFF2-40B4-BE49-F238E27FC236}">
+                <a16:creationId xmlns:a16="http://schemas.microsoft.com/office/drawing/2014/main" id="{3623FD25-7F97-4E7F-9F1F-BE840BA5A287}"/>
+              </a:ext>
+            </a:extLst>
+          </p:cNvPr>
+          <p:cNvCxnSpPr>
+            <a:cxnSpLocks/>
+          </p:cNvCxnSpPr>
+          <p:nvPr/>
+        </p:nvCxnSpPr>
+        <p:spPr>
+          <a:xfrm>
+            <a:off x="4154180" y="3645520"/>
+            <a:ext cx="2586862" cy="0"/>
+          </a:xfrm>
+          <a:prstGeom prst="straightConnector1">
+            <a:avLst/>
+          </a:prstGeom>
+          <a:ln>
+            <a:tailEnd type="triangle"/>
+          </a:ln>
+        </p:spPr>
+        <p:style>
+          <a:lnRef idx="1">
+            <a:schemeClr val="accent1"/>
+          </a:lnRef>
+          <a:fillRef idx="0">
+            <a:schemeClr val="accent1"/>
+          </a:fillRef>
+          <a:effectRef idx="0">
+            <a:schemeClr val="accent1"/>
+          </a:effectRef>
+          <a:fontRef idx="minor">
+            <a:schemeClr val="tx1"/>
+          </a:fontRef>
+        </p:style>
+      </p:cxnSp>
+      <p:sp>
+        <p:nvSpPr>
+          <p:cNvPr id="32" name="TextBox 31">
+            <a:extLst>
+              <a:ext uri="{FF2B5EF4-FFF2-40B4-BE49-F238E27FC236}">
+                <a16:creationId xmlns:a16="http://schemas.microsoft.com/office/drawing/2014/main" id="{BD53216A-0CAC-47AB-BD1B-A358514F9053}"/>
+              </a:ext>
+            </a:extLst>
+          </p:cNvPr>
+          <p:cNvSpPr txBox="1"/>
+          <p:nvPr/>
+        </p:nvSpPr>
+        <p:spPr>
+          <a:xfrm>
+            <a:off x="713291" y="3870237"/>
+            <a:ext cx="3539732" cy="461665"/>
+          </a:xfrm>
+          <a:prstGeom prst="rect">
+            <a:avLst/>
+          </a:prstGeom>
+        </p:spPr>
+        <p:style>
+          <a:lnRef idx="2">
+            <a:schemeClr val="accent1"/>
+          </a:lnRef>
+          <a:fillRef idx="1">
+            <a:schemeClr val="lt1"/>
+          </a:fillRef>
+          <a:effectRef idx="0">
+            <a:schemeClr val="accent1"/>
+          </a:effectRef>
+          <a:fontRef idx="minor">
+            <a:schemeClr val="dk1"/>
+          </a:fontRef>
+        </p:style>
+        <p:txBody>
+          <a:bodyPr wrap="square">
+            <a:spAutoFit/>
+          </a:bodyPr>
+          <a:lstStyle/>
+          <a:p>
+            <a:pPr algn="ctr"/>
+            <a:r>
+              <a:rPr lang="en-US" sz="1200" b="1" dirty="0">
+                <a:latin typeface="Consolas" panose="020B0609020204030204" pitchFamily="49" charset="0"/>
+              </a:rPr>
+              <a:t>2. Model </a:t>
+            </a:r>
+            <a:r>
+              <a:rPr lang="en-US" sz="1200" dirty="0">
+                <a:latin typeface="Consolas" panose="020B0609020204030204" pitchFamily="49" charset="0"/>
+              </a:rPr>
+              <a:t>behavior of principal components (using a VAR)</a:t>
+            </a:r>
+            <a:endParaRPr lang="en-US" sz="1200" b="1" dirty="0">
+              <a:latin typeface="Consolas" panose="020B0609020204030204" pitchFamily="49" charset="0"/>
+            </a:endParaRPr>
+          </a:p>
+        </p:txBody>
+      </p:sp>
+      <p:sp>
+        <p:nvSpPr>
+          <p:cNvPr id="33" name="TextBox 32">
+            <a:extLst>
+              <a:ext uri="{FF2B5EF4-FFF2-40B4-BE49-F238E27FC236}">
+                <a16:creationId xmlns:a16="http://schemas.microsoft.com/office/drawing/2014/main" id="{3447610A-F331-4FE9-9EF8-6061E2518D48}"/>
+              </a:ext>
+            </a:extLst>
+          </p:cNvPr>
+          <p:cNvSpPr txBox="1"/>
+          <p:nvPr/>
+        </p:nvSpPr>
+        <p:spPr>
+          <a:xfrm>
+            <a:off x="4515687" y="3777903"/>
+            <a:ext cx="2131397" cy="646331"/>
+          </a:xfrm>
+          <a:prstGeom prst="rect">
+            <a:avLst/>
+          </a:prstGeom>
+        </p:spPr>
+        <p:style>
+          <a:lnRef idx="2">
+            <a:schemeClr val="accent1"/>
+          </a:lnRef>
+          <a:fillRef idx="1">
+            <a:schemeClr val="lt1"/>
+          </a:fillRef>
+          <a:effectRef idx="0">
+            <a:schemeClr val="accent1"/>
+          </a:effectRef>
+          <a:fontRef idx="minor">
+            <a:schemeClr val="dk1"/>
+          </a:fontRef>
+        </p:style>
+        <p:txBody>
+          <a:bodyPr wrap="square">
+            <a:spAutoFit/>
+          </a:bodyPr>
+          <a:lstStyle/>
+          <a:p>
+            <a:pPr algn="ctr"/>
+            <a:r>
+              <a:rPr lang="en-US" sz="1200" b="1" dirty="0">
+                <a:latin typeface="Consolas" panose="020B0609020204030204" pitchFamily="49" charset="0"/>
+              </a:rPr>
+              <a:t>3. Forecast </a:t>
+            </a:r>
+            <a:r>
+              <a:rPr lang="en-US" sz="1200" dirty="0">
+                <a:latin typeface="Consolas" panose="020B0609020204030204" pitchFamily="49" charset="0"/>
+              </a:rPr>
+              <a:t>forward the principal components using the model</a:t>
+            </a:r>
+            <a:endParaRPr lang="en-US" sz="1200" b="1" dirty="0">
+              <a:latin typeface="Consolas" panose="020B0609020204030204" pitchFamily="49" charset="0"/>
+            </a:endParaRPr>
+          </a:p>
+        </p:txBody>
+      </p:sp>
+      <p:sp>
+        <p:nvSpPr>
+          <p:cNvPr id="35" name="Right Brace 34">
+            <a:extLst>
+              <a:ext uri="{FF2B5EF4-FFF2-40B4-BE49-F238E27FC236}">
+                <a16:creationId xmlns:a16="http://schemas.microsoft.com/office/drawing/2014/main" id="{1455EFBD-9BC1-4B79-87F0-B7E6E5578AE6}"/>
+              </a:ext>
+            </a:extLst>
+          </p:cNvPr>
+          <p:cNvSpPr/>
+          <p:nvPr/>
+        </p:nvSpPr>
+        <p:spPr>
+          <a:xfrm rot="16200000" flipH="1">
+            <a:off x="3861508" y="1839200"/>
+            <a:ext cx="276998" cy="5482070"/>
+          </a:xfrm>
+          <a:prstGeom prst="rightBrace">
+            <a:avLst/>
+          </a:prstGeom>
+        </p:spPr>
+        <p:style>
+          <a:lnRef idx="3">
+            <a:schemeClr val="accent2"/>
+          </a:lnRef>
+          <a:fillRef idx="0">
+            <a:schemeClr val="accent2"/>
+          </a:fillRef>
+          <a:effectRef idx="2">
+            <a:schemeClr val="accent2"/>
+          </a:effectRef>
+          <a:fontRef idx="minor">
+            <a:schemeClr val="tx1"/>
+          </a:fontRef>
+        </p:style>
+        <p:txBody>
+          <a:bodyPr rtlCol="0" anchor="ctr"/>
+          <a:lstStyle/>
+          <a:p>
+            <a:pPr algn="ctr"/>
+            <a:endParaRPr lang="en-US"/>
+          </a:p>
+        </p:txBody>
+      </p:sp>
+      <p:sp>
+        <p:nvSpPr>
+          <p:cNvPr id="36" name="TextBox 35">
+            <a:extLst>
+              <a:ext uri="{FF2B5EF4-FFF2-40B4-BE49-F238E27FC236}">
+                <a16:creationId xmlns:a16="http://schemas.microsoft.com/office/drawing/2014/main" id="{A0B6F4EE-A5F4-459B-AE12-499C2C6045DB}"/>
+              </a:ext>
+            </a:extLst>
+          </p:cNvPr>
+          <p:cNvSpPr txBox="1"/>
+          <p:nvPr/>
+        </p:nvSpPr>
+        <p:spPr>
+          <a:xfrm>
+            <a:off x="1758949" y="5774638"/>
+            <a:ext cx="4493071" cy="461665"/>
+          </a:xfrm>
+          <a:prstGeom prst="rect">
+            <a:avLst/>
+          </a:prstGeom>
+        </p:spPr>
+        <p:style>
+          <a:lnRef idx="2">
+            <a:schemeClr val="dk1"/>
+          </a:lnRef>
+          <a:fillRef idx="1">
+            <a:schemeClr val="lt1"/>
+          </a:fillRef>
+          <a:effectRef idx="0">
+            <a:schemeClr val="dk1"/>
+          </a:effectRef>
+          <a:fontRef idx="minor">
+            <a:schemeClr val="dk1"/>
+          </a:fontRef>
+        </p:style>
+        <p:txBody>
+          <a:bodyPr wrap="square">
+            <a:spAutoFit/>
+          </a:bodyPr>
+          <a:lstStyle/>
+          <a:p>
+            <a:pPr algn="ctr"/>
+            <a:r>
+              <a:rPr lang="en-US" sz="1200" b="1" dirty="0">
+                <a:latin typeface="Consolas" panose="020B0609020204030204" pitchFamily="49" charset="0"/>
+              </a:rPr>
+              <a:t>5. Forecast </a:t>
+            </a:r>
+            <a:r>
+              <a:rPr lang="en-US" sz="1200" dirty="0">
+                <a:latin typeface="Consolas" panose="020B0609020204030204" pitchFamily="49" charset="0"/>
+              </a:rPr>
+              <a:t>variables of interest using the smoothed factors as an ARIMA-DFM model</a:t>
+            </a:r>
+            <a:endParaRPr lang="en-US" sz="1200" b="1" dirty="0">
+              <a:latin typeface="Consolas" panose="020B0609020204030204" pitchFamily="49" charset="0"/>
+            </a:endParaRPr>
+          </a:p>
+        </p:txBody>
+      </p:sp>
+      <p:cxnSp>
+        <p:nvCxnSpPr>
+          <p:cNvPr id="15" name="Straight Arrow Connector 14">
+            <a:extLst>
+              <a:ext uri="{FF2B5EF4-FFF2-40B4-BE49-F238E27FC236}">
+                <a16:creationId xmlns:a16="http://schemas.microsoft.com/office/drawing/2014/main" id="{F074DA09-3BD2-43AF-81B8-B0864C1E61C8}"/>
+              </a:ext>
+            </a:extLst>
+          </p:cNvPr>
+          <p:cNvCxnSpPr>
+            <a:stCxn id="30" idx="2"/>
+            <a:endCxn id="36" idx="0"/>
+          </p:cNvCxnSpPr>
+          <p:nvPr/>
+        </p:nvCxnSpPr>
+        <p:spPr>
+          <a:xfrm>
+            <a:off x="4005485" y="5444864"/>
+            <a:ext cx="0" cy="329774"/>
+          </a:xfrm>
+          <a:prstGeom prst="straightConnector1">
+            <a:avLst/>
+          </a:prstGeom>
+          <a:ln>
+            <a:tailEnd type="triangle"/>
+          </a:ln>
+        </p:spPr>
+        <p:style>
+          <a:lnRef idx="3">
+            <a:schemeClr val="dk1"/>
+          </a:lnRef>
+          <a:fillRef idx="0">
+            <a:schemeClr val="dk1"/>
+          </a:fillRef>
+          <a:effectRef idx="2">
+            <a:schemeClr val="dk1"/>
+          </a:effectRef>
+          <a:fontRef idx="minor">
+            <a:schemeClr val="tx1"/>
+          </a:fontRef>
+        </p:style>
+      </p:cxnSp>
     </p:spTree>
     <p:extLst>
       <p:ext uri="{BB962C8B-B14F-4D97-AF65-F5344CB8AC3E}">

</xml_diff>